<commit_message>
Solución a ejercicios y arreglo en diapositiva 49 falta la palabra length
</commit_message>
<xml_diff>
--- a/Javascript.pptx
+++ b/Javascript.pptx
@@ -160,7 +160,7 @@
   </p:defaultTextStyle>
   <p:extLst>
     <p:ext uri="{EFAFB233-063F-42B5-8137-9DF3F51BA10A}">
-      <p15:sldGuideLst xmlns:p15="http://schemas.microsoft.com/office/powerpoint/2012/main"/>
+      <p15:sldGuideLst xmlns:p15="http://schemas.microsoft.com/office/powerpoint/2012/main" xmlns=""/>
     </p:ext>
   </p:extLst>
 </p:presentation>
@@ -297,7 +297,7 @@
           <a:p>
             <a:fld id="{E90E2C9C-6439-4DAD-BC39-B815E0F702E3}" type="datetimeFigureOut">
               <a:rPr lang="es-MX" smtClean="0"/>
-              <a:t>22/10/2015</a:t>
+              <a:t>23/10/2015</a:t>
             </a:fld>
             <a:endParaRPr lang="es-MX"/>
           </a:p>
@@ -467,7 +467,7 @@
           <a:p>
             <a:fld id="{E90E2C9C-6439-4DAD-BC39-B815E0F702E3}" type="datetimeFigureOut">
               <a:rPr lang="es-MX" smtClean="0"/>
-              <a:t>22/10/2015</a:t>
+              <a:t>23/10/2015</a:t>
             </a:fld>
             <a:endParaRPr lang="es-MX"/>
           </a:p>
@@ -647,7 +647,7 @@
           <a:p>
             <a:fld id="{E90E2C9C-6439-4DAD-BC39-B815E0F702E3}" type="datetimeFigureOut">
               <a:rPr lang="es-MX" smtClean="0"/>
-              <a:t>22/10/2015</a:t>
+              <a:t>23/10/2015</a:t>
             </a:fld>
             <a:endParaRPr lang="es-MX"/>
           </a:p>
@@ -817,7 +817,7 @@
           <a:p>
             <a:fld id="{E90E2C9C-6439-4DAD-BC39-B815E0F702E3}" type="datetimeFigureOut">
               <a:rPr lang="es-MX" smtClean="0"/>
-              <a:t>22/10/2015</a:t>
+              <a:t>23/10/2015</a:t>
             </a:fld>
             <a:endParaRPr lang="es-MX"/>
           </a:p>
@@ -1061,7 +1061,7 @@
           <a:p>
             <a:fld id="{E90E2C9C-6439-4DAD-BC39-B815E0F702E3}" type="datetimeFigureOut">
               <a:rPr lang="es-MX" smtClean="0"/>
-              <a:t>22/10/2015</a:t>
+              <a:t>23/10/2015</a:t>
             </a:fld>
             <a:endParaRPr lang="es-MX"/>
           </a:p>
@@ -1293,7 +1293,7 @@
           <a:p>
             <a:fld id="{E90E2C9C-6439-4DAD-BC39-B815E0F702E3}" type="datetimeFigureOut">
               <a:rPr lang="es-MX" smtClean="0"/>
-              <a:t>22/10/2015</a:t>
+              <a:t>23/10/2015</a:t>
             </a:fld>
             <a:endParaRPr lang="es-MX"/>
           </a:p>
@@ -1660,7 +1660,7 @@
           <a:p>
             <a:fld id="{E90E2C9C-6439-4DAD-BC39-B815E0F702E3}" type="datetimeFigureOut">
               <a:rPr lang="es-MX" smtClean="0"/>
-              <a:t>22/10/2015</a:t>
+              <a:t>23/10/2015</a:t>
             </a:fld>
             <a:endParaRPr lang="es-MX"/>
           </a:p>
@@ -1778,7 +1778,7 @@
           <a:p>
             <a:fld id="{E90E2C9C-6439-4DAD-BC39-B815E0F702E3}" type="datetimeFigureOut">
               <a:rPr lang="es-MX" smtClean="0"/>
-              <a:t>22/10/2015</a:t>
+              <a:t>23/10/2015</a:t>
             </a:fld>
             <a:endParaRPr lang="es-MX"/>
           </a:p>
@@ -1873,7 +1873,7 @@
           <a:p>
             <a:fld id="{E90E2C9C-6439-4DAD-BC39-B815E0F702E3}" type="datetimeFigureOut">
               <a:rPr lang="es-MX" smtClean="0"/>
-              <a:t>22/10/2015</a:t>
+              <a:t>23/10/2015</a:t>
             </a:fld>
             <a:endParaRPr lang="es-MX"/>
           </a:p>
@@ -2150,7 +2150,7 @@
           <a:p>
             <a:fld id="{E90E2C9C-6439-4DAD-BC39-B815E0F702E3}" type="datetimeFigureOut">
               <a:rPr lang="es-MX" smtClean="0"/>
-              <a:t>22/10/2015</a:t>
+              <a:t>23/10/2015</a:t>
             </a:fld>
             <a:endParaRPr lang="es-MX"/>
           </a:p>
@@ -2407,7 +2407,7 @@
           <a:p>
             <a:fld id="{E90E2C9C-6439-4DAD-BC39-B815E0F702E3}" type="datetimeFigureOut">
               <a:rPr lang="es-MX" smtClean="0"/>
-              <a:t>22/10/2015</a:t>
+              <a:t>23/10/2015</a:t>
             </a:fld>
             <a:endParaRPr lang="es-MX"/>
           </a:p>
@@ -2620,7 +2620,7 @@
           <a:p>
             <a:fld id="{E90E2C9C-6439-4DAD-BC39-B815E0F702E3}" type="datetimeFigureOut">
               <a:rPr lang="es-MX" smtClean="0"/>
-              <a:t>22/10/2015</a:t>
+              <a:t>23/10/2015</a:t>
             </a:fld>
             <a:endParaRPr lang="es-MX"/>
           </a:p>
@@ -17283,7 +17283,19 @@
               <a:rPr lang="es-MX" altLang="es-MX" dirty="0" smtClean="0">
                 <a:latin typeface="+mj-lt"/>
               </a:rPr>
-              <a:t>longitud =talleres; </a:t>
+              <a:t>longitud =</a:t>
+            </a:r>
+            <a:r>
+              <a:rPr lang="es-MX" altLang="es-MX" dirty="0" err="1">
+                <a:latin typeface="+mj-lt"/>
+              </a:rPr>
+              <a:t>talleres.length</a:t>
+            </a:r>
+            <a:r>
+              <a:rPr lang="es-MX" altLang="es-MX" dirty="0">
+                <a:latin typeface="+mj-lt"/>
+              </a:rPr>
+              <a:t>; </a:t>
             </a:r>
             <a:r>
               <a:rPr lang="es-MX" altLang="es-MX" dirty="0">
@@ -19805,7 +19817,7 @@
   <a:extraClrSchemeLst/>
   <a:extLst>
     <a:ext uri="{05A4C25C-085E-4340-85A3-A5531E510DB2}">
-      <thm15:themeFamily xmlns:thm15="http://schemas.microsoft.com/office/thememl/2012/main" name="Office Theme" id="{62F939B6-93AF-4DB8-9C6B-D6C7DFDC589F}" vid="{4A3C46E8-61CC-4603-A589-7422A47A8E4A}"/>
+      <thm15:themeFamily xmlns:thm15="http://schemas.microsoft.com/office/thememl/2012/main" xmlns="" name="Office Theme" id="{62F939B6-93AF-4DB8-9C6B-D6C7DFDC589F}" vid="{4A3C46E8-61CC-4603-A589-7422A47A8E4A}"/>
     </a:ext>
   </a:extLst>
 </a:theme>

</xml_diff>

<commit_message>
Revert "Solución a ejercicios "
</commit_message>
<xml_diff>
--- a/Javascript.pptx
+++ b/Javascript.pptx
@@ -160,7 +160,7 @@
   </p:defaultTextStyle>
   <p:extLst>
     <p:ext uri="{EFAFB233-063F-42B5-8137-9DF3F51BA10A}">
-      <p15:sldGuideLst xmlns:p15="http://schemas.microsoft.com/office/powerpoint/2012/main" xmlns=""/>
+      <p15:sldGuideLst xmlns:p15="http://schemas.microsoft.com/office/powerpoint/2012/main"/>
     </p:ext>
   </p:extLst>
 </p:presentation>
@@ -297,7 +297,7 @@
           <a:p>
             <a:fld id="{E90E2C9C-6439-4DAD-BC39-B815E0F702E3}" type="datetimeFigureOut">
               <a:rPr lang="es-MX" smtClean="0"/>
-              <a:t>23/10/2015</a:t>
+              <a:t>22/10/2015</a:t>
             </a:fld>
             <a:endParaRPr lang="es-MX"/>
           </a:p>
@@ -467,7 +467,7 @@
           <a:p>
             <a:fld id="{E90E2C9C-6439-4DAD-BC39-B815E0F702E3}" type="datetimeFigureOut">
               <a:rPr lang="es-MX" smtClean="0"/>
-              <a:t>23/10/2015</a:t>
+              <a:t>22/10/2015</a:t>
             </a:fld>
             <a:endParaRPr lang="es-MX"/>
           </a:p>
@@ -647,7 +647,7 @@
           <a:p>
             <a:fld id="{E90E2C9C-6439-4DAD-BC39-B815E0F702E3}" type="datetimeFigureOut">
               <a:rPr lang="es-MX" smtClean="0"/>
-              <a:t>23/10/2015</a:t>
+              <a:t>22/10/2015</a:t>
             </a:fld>
             <a:endParaRPr lang="es-MX"/>
           </a:p>
@@ -817,7 +817,7 @@
           <a:p>
             <a:fld id="{E90E2C9C-6439-4DAD-BC39-B815E0F702E3}" type="datetimeFigureOut">
               <a:rPr lang="es-MX" smtClean="0"/>
-              <a:t>23/10/2015</a:t>
+              <a:t>22/10/2015</a:t>
             </a:fld>
             <a:endParaRPr lang="es-MX"/>
           </a:p>
@@ -1061,7 +1061,7 @@
           <a:p>
             <a:fld id="{E90E2C9C-6439-4DAD-BC39-B815E0F702E3}" type="datetimeFigureOut">
               <a:rPr lang="es-MX" smtClean="0"/>
-              <a:t>23/10/2015</a:t>
+              <a:t>22/10/2015</a:t>
             </a:fld>
             <a:endParaRPr lang="es-MX"/>
           </a:p>
@@ -1293,7 +1293,7 @@
           <a:p>
             <a:fld id="{E90E2C9C-6439-4DAD-BC39-B815E0F702E3}" type="datetimeFigureOut">
               <a:rPr lang="es-MX" smtClean="0"/>
-              <a:t>23/10/2015</a:t>
+              <a:t>22/10/2015</a:t>
             </a:fld>
             <a:endParaRPr lang="es-MX"/>
           </a:p>
@@ -1660,7 +1660,7 @@
           <a:p>
             <a:fld id="{E90E2C9C-6439-4DAD-BC39-B815E0F702E3}" type="datetimeFigureOut">
               <a:rPr lang="es-MX" smtClean="0"/>
-              <a:t>23/10/2015</a:t>
+              <a:t>22/10/2015</a:t>
             </a:fld>
             <a:endParaRPr lang="es-MX"/>
           </a:p>
@@ -1778,7 +1778,7 @@
           <a:p>
             <a:fld id="{E90E2C9C-6439-4DAD-BC39-B815E0F702E3}" type="datetimeFigureOut">
               <a:rPr lang="es-MX" smtClean="0"/>
-              <a:t>23/10/2015</a:t>
+              <a:t>22/10/2015</a:t>
             </a:fld>
             <a:endParaRPr lang="es-MX"/>
           </a:p>
@@ -1873,7 +1873,7 @@
           <a:p>
             <a:fld id="{E90E2C9C-6439-4DAD-BC39-B815E0F702E3}" type="datetimeFigureOut">
               <a:rPr lang="es-MX" smtClean="0"/>
-              <a:t>23/10/2015</a:t>
+              <a:t>22/10/2015</a:t>
             </a:fld>
             <a:endParaRPr lang="es-MX"/>
           </a:p>
@@ -2150,7 +2150,7 @@
           <a:p>
             <a:fld id="{E90E2C9C-6439-4DAD-BC39-B815E0F702E3}" type="datetimeFigureOut">
               <a:rPr lang="es-MX" smtClean="0"/>
-              <a:t>23/10/2015</a:t>
+              <a:t>22/10/2015</a:t>
             </a:fld>
             <a:endParaRPr lang="es-MX"/>
           </a:p>
@@ -2407,7 +2407,7 @@
           <a:p>
             <a:fld id="{E90E2C9C-6439-4DAD-BC39-B815E0F702E3}" type="datetimeFigureOut">
               <a:rPr lang="es-MX" smtClean="0"/>
-              <a:t>23/10/2015</a:t>
+              <a:t>22/10/2015</a:t>
             </a:fld>
             <a:endParaRPr lang="es-MX"/>
           </a:p>
@@ -2620,7 +2620,7 @@
           <a:p>
             <a:fld id="{E90E2C9C-6439-4DAD-BC39-B815E0F702E3}" type="datetimeFigureOut">
               <a:rPr lang="es-MX" smtClean="0"/>
-              <a:t>23/10/2015</a:t>
+              <a:t>22/10/2015</a:t>
             </a:fld>
             <a:endParaRPr lang="es-MX"/>
           </a:p>
@@ -17283,19 +17283,7 @@
               <a:rPr lang="es-MX" altLang="es-MX" dirty="0" smtClean="0">
                 <a:latin typeface="+mj-lt"/>
               </a:rPr>
-              <a:t>longitud =</a:t>
-            </a:r>
-            <a:r>
-              <a:rPr lang="es-MX" altLang="es-MX" dirty="0" err="1">
-                <a:latin typeface="+mj-lt"/>
-              </a:rPr>
-              <a:t>talleres.length</a:t>
-            </a:r>
-            <a:r>
-              <a:rPr lang="es-MX" altLang="es-MX" dirty="0">
-                <a:latin typeface="+mj-lt"/>
-              </a:rPr>
-              <a:t>; </a:t>
+              <a:t>longitud =talleres; </a:t>
             </a:r>
             <a:r>
               <a:rPr lang="es-MX" altLang="es-MX" dirty="0">
@@ -19817,7 +19805,7 @@
   <a:extraClrSchemeLst/>
   <a:extLst>
     <a:ext uri="{05A4C25C-085E-4340-85A3-A5531E510DB2}">
-      <thm15:themeFamily xmlns:thm15="http://schemas.microsoft.com/office/thememl/2012/main" xmlns="" name="Office Theme" id="{62F939B6-93AF-4DB8-9C6B-D6C7DFDC589F}" vid="{4A3C46E8-61CC-4603-A589-7422A47A8E4A}"/>
+      <thm15:themeFamily xmlns:thm15="http://schemas.microsoft.com/office/thememl/2012/main" name="Office Theme" id="{62F939B6-93AF-4DB8-9C6B-D6C7DFDC589F}" vid="{4A3C46E8-61CC-4603-A589-7422A47A8E4A}"/>
     </a:ext>
   </a:extLst>
 </a:theme>

</xml_diff>